<commit_message>
doc: Add tutorial screenshot in Readme
</commit_message>
<xml_diff>
--- a/doc/tutorial/fuzzie-tutorial-screenshots.pptx
+++ b/doc/tutorial/fuzzie-tutorial-screenshots.pptx
@@ -10,6 +10,7 @@
     <p:sldId id="259" r:id="rId4"/>
     <p:sldId id="258" r:id="rId5"/>
     <p:sldId id="260" r:id="rId6"/>
+    <p:sldId id="261" r:id="rId7"/>
   </p:sldIdLst>
   <p:sldSz cx="12192000" cy="6858000"/>
   <p:notesSz cx="6858000" cy="9144000"/>
@@ -108,6 +109,11 @@
       </a:defRPr>
     </a:lvl9pPr>
   </p:defaultTextStyle>
+  <p:extLst>
+    <p:ext uri="{EFAFB233-063F-42B5-8137-9DF3F51BA10A}">
+      <p15:sldGuideLst xmlns:p15="http://schemas.microsoft.com/office/powerpoint/2012/main"/>
+    </p:ext>
+  </p:extLst>
 </p:presentation>
 </file>
 
@@ -260,7 +266,7 @@
           <a:p>
             <a:fld id="{686B346B-32DD-4907-B5CA-4C554000C05A}" type="datetimeFigureOut">
               <a:rPr lang="en-SG" smtClean="0"/>
-              <a:t>12/2/2023</a:t>
+              <a:t>14/2/2023</a:t>
             </a:fld>
             <a:endParaRPr lang="en-SG"/>
           </a:p>
@@ -460,7 +466,7 @@
           <a:p>
             <a:fld id="{686B346B-32DD-4907-B5CA-4C554000C05A}" type="datetimeFigureOut">
               <a:rPr lang="en-SG" smtClean="0"/>
-              <a:t>12/2/2023</a:t>
+              <a:t>14/2/2023</a:t>
             </a:fld>
             <a:endParaRPr lang="en-SG"/>
           </a:p>
@@ -670,7 +676,7 @@
           <a:p>
             <a:fld id="{686B346B-32DD-4907-B5CA-4C554000C05A}" type="datetimeFigureOut">
               <a:rPr lang="en-SG" smtClean="0"/>
-              <a:t>12/2/2023</a:t>
+              <a:t>14/2/2023</a:t>
             </a:fld>
             <a:endParaRPr lang="en-SG"/>
           </a:p>
@@ -870,7 +876,7 @@
           <a:p>
             <a:fld id="{686B346B-32DD-4907-B5CA-4C554000C05A}" type="datetimeFigureOut">
               <a:rPr lang="en-SG" smtClean="0"/>
-              <a:t>12/2/2023</a:t>
+              <a:t>14/2/2023</a:t>
             </a:fld>
             <a:endParaRPr lang="en-SG"/>
           </a:p>
@@ -1146,7 +1152,7 @@
           <a:p>
             <a:fld id="{686B346B-32DD-4907-B5CA-4C554000C05A}" type="datetimeFigureOut">
               <a:rPr lang="en-SG" smtClean="0"/>
-              <a:t>12/2/2023</a:t>
+              <a:t>14/2/2023</a:t>
             </a:fld>
             <a:endParaRPr lang="en-SG"/>
           </a:p>
@@ -1414,7 +1420,7 @@
           <a:p>
             <a:fld id="{686B346B-32DD-4907-B5CA-4C554000C05A}" type="datetimeFigureOut">
               <a:rPr lang="en-SG" smtClean="0"/>
-              <a:t>12/2/2023</a:t>
+              <a:t>14/2/2023</a:t>
             </a:fld>
             <a:endParaRPr lang="en-SG"/>
           </a:p>
@@ -1829,7 +1835,7 @@
           <a:p>
             <a:fld id="{686B346B-32DD-4907-B5CA-4C554000C05A}" type="datetimeFigureOut">
               <a:rPr lang="en-SG" smtClean="0"/>
-              <a:t>12/2/2023</a:t>
+              <a:t>14/2/2023</a:t>
             </a:fld>
             <a:endParaRPr lang="en-SG"/>
           </a:p>
@@ -1971,7 +1977,7 @@
           <a:p>
             <a:fld id="{686B346B-32DD-4907-B5CA-4C554000C05A}" type="datetimeFigureOut">
               <a:rPr lang="en-SG" smtClean="0"/>
-              <a:t>12/2/2023</a:t>
+              <a:t>14/2/2023</a:t>
             </a:fld>
             <a:endParaRPr lang="en-SG"/>
           </a:p>
@@ -2084,7 +2090,7 @@
           <a:p>
             <a:fld id="{686B346B-32DD-4907-B5CA-4C554000C05A}" type="datetimeFigureOut">
               <a:rPr lang="en-SG" smtClean="0"/>
-              <a:t>12/2/2023</a:t>
+              <a:t>14/2/2023</a:t>
             </a:fld>
             <a:endParaRPr lang="en-SG"/>
           </a:p>
@@ -2397,7 +2403,7 @@
           <a:p>
             <a:fld id="{686B346B-32DD-4907-B5CA-4C554000C05A}" type="datetimeFigureOut">
               <a:rPr lang="en-SG" smtClean="0"/>
-              <a:t>12/2/2023</a:t>
+              <a:t>14/2/2023</a:t>
             </a:fld>
             <a:endParaRPr lang="en-SG"/>
           </a:p>
@@ -2686,7 +2692,7 @@
           <a:p>
             <a:fld id="{686B346B-32DD-4907-B5CA-4C554000C05A}" type="datetimeFigureOut">
               <a:rPr lang="en-SG" smtClean="0"/>
-              <a:t>12/2/2023</a:t>
+              <a:t>14/2/2023</a:t>
             </a:fld>
             <a:endParaRPr lang="en-SG"/>
           </a:p>
@@ -2929,7 +2935,7 @@
           <a:p>
             <a:fld id="{686B346B-32DD-4907-B5CA-4C554000C05A}" type="datetimeFigureOut">
               <a:rPr lang="en-SG" smtClean="0"/>
-              <a:t>12/2/2023</a:t>
+              <a:t>14/2/2023</a:t>
             </a:fld>
             <a:endParaRPr lang="en-SG"/>
           </a:p>
@@ -4558,6 +4564,907 @@
 </p:sld>
 </file>
 
+<file path=ppt/slides/slide6.xml><?xml version="1.0" encoding="utf-8"?>
+<p:sld xmlns:a="http://schemas.openxmlformats.org/drawingml/2006/main" xmlns:r="http://schemas.openxmlformats.org/officeDocument/2006/relationships" xmlns:p="http://schemas.openxmlformats.org/presentationml/2006/main">
+  <p:cSld>
+    <p:spTree>
+      <p:nvGrpSpPr>
+        <p:cNvPr id="1" name=""/>
+        <p:cNvGrpSpPr/>
+        <p:nvPr/>
+      </p:nvGrpSpPr>
+      <p:grpSpPr>
+        <a:xfrm>
+          <a:off x="0" y="0"/>
+          <a:ext cx="0" cy="0"/>
+          <a:chOff x="0" y="0"/>
+          <a:chExt cx="0" cy="0"/>
+        </a:xfrm>
+      </p:grpSpPr>
+      <p:pic>
+        <p:nvPicPr>
+          <p:cNvPr id="24" name="Picture 23">
+            <a:extLst>
+              <a:ext uri="{FF2B5EF4-FFF2-40B4-BE49-F238E27FC236}">
+                <a16:creationId xmlns:a16="http://schemas.microsoft.com/office/drawing/2014/main" id="{9F0FF5AE-6B5F-9BC9-4B28-B8C89884CFC1}"/>
+              </a:ext>
+            </a:extLst>
+          </p:cNvPr>
+          <p:cNvPicPr>
+            <a:picLocks noChangeAspect="1"/>
+          </p:cNvPicPr>
+          <p:nvPr/>
+        </p:nvPicPr>
+        <p:blipFill>
+          <a:blip r:embed="rId2"/>
+          <a:stretch>
+            <a:fillRect/>
+          </a:stretch>
+        </p:blipFill>
+        <p:spPr>
+          <a:xfrm>
+            <a:off x="697574" y="0"/>
+            <a:ext cx="10796851" cy="6858000"/>
+          </a:xfrm>
+          <a:prstGeom prst="rect">
+            <a:avLst/>
+          </a:prstGeom>
+        </p:spPr>
+      </p:pic>
+      <p:cxnSp>
+        <p:nvCxnSpPr>
+          <p:cNvPr id="9" name="Straight Connector 8">
+            <a:extLst>
+              <a:ext uri="{FF2B5EF4-FFF2-40B4-BE49-F238E27FC236}">
+                <a16:creationId xmlns:a16="http://schemas.microsoft.com/office/drawing/2014/main" id="{614C0D63-3BEF-2F73-D53C-BD02DA67832B}"/>
+              </a:ext>
+            </a:extLst>
+          </p:cNvPr>
+          <p:cNvCxnSpPr>
+            <a:cxnSpLocks/>
+            <a:endCxn id="8" idx="3"/>
+          </p:cNvCxnSpPr>
+          <p:nvPr/>
+        </p:nvCxnSpPr>
+        <p:spPr>
+          <a:xfrm flipH="1" flipV="1">
+            <a:off x="2850225" y="897154"/>
+            <a:ext cx="872380" cy="252373"/>
+          </a:xfrm>
+          <a:prstGeom prst="line">
+            <a:avLst/>
+          </a:prstGeom>
+          <a:ln w="15875">
+            <a:solidFill>
+              <a:schemeClr val="accent2">
+                <a:lumMod val="75000"/>
+              </a:schemeClr>
+            </a:solidFill>
+          </a:ln>
+        </p:spPr>
+        <p:style>
+          <a:lnRef idx="1">
+            <a:schemeClr val="accent1"/>
+          </a:lnRef>
+          <a:fillRef idx="0">
+            <a:schemeClr val="accent1"/>
+          </a:fillRef>
+          <a:effectRef idx="0">
+            <a:schemeClr val="accent1"/>
+          </a:effectRef>
+          <a:fontRef idx="minor">
+            <a:schemeClr val="tx1"/>
+          </a:fontRef>
+        </p:style>
+      </p:cxnSp>
+      <p:sp>
+        <p:nvSpPr>
+          <p:cNvPr id="14" name="TextBox 13">
+            <a:extLst>
+              <a:ext uri="{FF2B5EF4-FFF2-40B4-BE49-F238E27FC236}">
+                <a16:creationId xmlns:a16="http://schemas.microsoft.com/office/drawing/2014/main" id="{A1F68606-762F-8986-543B-798442610887}"/>
+              </a:ext>
+            </a:extLst>
+          </p:cNvPr>
+          <p:cNvSpPr txBox="1"/>
+          <p:nvPr/>
+        </p:nvSpPr>
+        <p:spPr>
+          <a:xfrm>
+            <a:off x="2814525" y="1382000"/>
+            <a:ext cx="1321196" cy="338554"/>
+          </a:xfrm>
+          <a:prstGeom prst="rect">
+            <a:avLst/>
+          </a:prstGeom>
+          <a:noFill/>
+        </p:spPr>
+        <p:txBody>
+          <a:bodyPr wrap="none" rtlCol="0">
+            <a:spAutoFit/>
+          </a:bodyPr>
+          <a:lstStyle/>
+          <a:p>
+            <a:r>
+              <a:rPr lang="en-SG" sz="800" b="1" dirty="0">
+                <a:latin typeface="Segoe UI" panose="020B0502040204020203" pitchFamily="34" charset="0"/>
+                <a:cs typeface="Segoe UI" panose="020B0502040204020203" pitchFamily="34" charset="0"/>
+              </a:rPr>
+              <a:t>click to see</a:t>
+            </a:r>
+          </a:p>
+          <a:p>
+            <a:r>
+              <a:rPr lang="en-SG" sz="800" b="1" dirty="0">
+                <a:latin typeface="Segoe UI" panose="020B0502040204020203" pitchFamily="34" charset="0"/>
+                <a:cs typeface="Segoe UI" panose="020B0502040204020203" pitchFamily="34" charset="0"/>
+              </a:rPr>
+              <a:t>number of fuzzing runs</a:t>
+            </a:r>
+          </a:p>
+        </p:txBody>
+      </p:sp>
+      <p:sp>
+        <p:nvSpPr>
+          <p:cNvPr id="8" name="TextBox 7">
+            <a:extLst>
+              <a:ext uri="{FF2B5EF4-FFF2-40B4-BE49-F238E27FC236}">
+                <a16:creationId xmlns:a16="http://schemas.microsoft.com/office/drawing/2014/main" id="{92152B1E-6DE5-A161-72F5-1B65E3CF0446}"/>
+              </a:ext>
+            </a:extLst>
+          </p:cNvPr>
+          <p:cNvSpPr txBox="1"/>
+          <p:nvPr/>
+        </p:nvSpPr>
+        <p:spPr>
+          <a:xfrm>
+            <a:off x="1945810" y="727877"/>
+            <a:ext cx="904415" cy="338554"/>
+          </a:xfrm>
+          <a:prstGeom prst="rect">
+            <a:avLst/>
+          </a:prstGeom>
+          <a:noFill/>
+          <a:ln>
+            <a:solidFill>
+              <a:schemeClr val="bg1"/>
+            </a:solidFill>
+          </a:ln>
+        </p:spPr>
+        <p:txBody>
+          <a:bodyPr wrap="none" rtlCol="0">
+            <a:spAutoFit/>
+          </a:bodyPr>
+          <a:lstStyle/>
+          <a:p>
+            <a:r>
+              <a:rPr lang="en-SG" sz="800" b="1" dirty="0">
+                <a:latin typeface="Segoe UI" panose="020B0502040204020203" pitchFamily="34" charset="0"/>
+                <a:cs typeface="Segoe UI" panose="020B0502040204020203" pitchFamily="34" charset="0"/>
+              </a:rPr>
+              <a:t>click to see</a:t>
+            </a:r>
+          </a:p>
+          <a:p>
+            <a:r>
+              <a:rPr lang="en-SG" sz="800" b="1" dirty="0">
+                <a:latin typeface="Segoe UI" panose="020B0502040204020203" pitchFamily="34" charset="0"/>
+                <a:cs typeface="Segoe UI" panose="020B0502040204020203" pitchFamily="34" charset="0"/>
+              </a:rPr>
+              <a:t>load fuzz cases</a:t>
+            </a:r>
+          </a:p>
+        </p:txBody>
+      </p:sp>
+      <p:sp>
+        <p:nvSpPr>
+          <p:cNvPr id="34" name="TextBox 33">
+            <a:extLst>
+              <a:ext uri="{FF2B5EF4-FFF2-40B4-BE49-F238E27FC236}">
+                <a16:creationId xmlns:a16="http://schemas.microsoft.com/office/drawing/2014/main" id="{71C2574B-494E-17B7-3328-647FDA6E87AA}"/>
+              </a:ext>
+            </a:extLst>
+          </p:cNvPr>
+          <p:cNvSpPr txBox="1"/>
+          <p:nvPr/>
+        </p:nvSpPr>
+        <p:spPr>
+          <a:xfrm>
+            <a:off x="7161535" y="3312869"/>
+            <a:ext cx="1159292" cy="215444"/>
+          </a:xfrm>
+          <a:prstGeom prst="rect">
+            <a:avLst/>
+          </a:prstGeom>
+          <a:noFill/>
+        </p:spPr>
+        <p:txBody>
+          <a:bodyPr wrap="none" rtlCol="0">
+            <a:spAutoFit/>
+          </a:bodyPr>
+          <a:lstStyle/>
+          <a:p>
+            <a:r>
+              <a:rPr lang="en-SG" sz="800" b="1" dirty="0">
+                <a:latin typeface="Segoe UI" panose="020B0502040204020203" pitchFamily="34" charset="0"/>
+                <a:cs typeface="Segoe UI" panose="020B0502040204020203" pitchFamily="34" charset="0"/>
+              </a:rPr>
+              <a:t>View request details</a:t>
+            </a:r>
+          </a:p>
+        </p:txBody>
+      </p:sp>
+      <p:sp>
+        <p:nvSpPr>
+          <p:cNvPr id="29" name="Rectangle 28">
+            <a:extLst>
+              <a:ext uri="{FF2B5EF4-FFF2-40B4-BE49-F238E27FC236}">
+                <a16:creationId xmlns:a16="http://schemas.microsoft.com/office/drawing/2014/main" id="{AD4E254A-EFAE-34DE-4BFB-A0EB6E226E98}"/>
+              </a:ext>
+            </a:extLst>
+          </p:cNvPr>
+          <p:cNvSpPr/>
+          <p:nvPr/>
+        </p:nvSpPr>
+        <p:spPr>
+          <a:xfrm>
+            <a:off x="4515663" y="1191754"/>
+            <a:ext cx="245252" cy="192670"/>
+          </a:xfrm>
+          <a:prstGeom prst="rect">
+            <a:avLst/>
+          </a:prstGeom>
+          <a:noFill/>
+          <a:ln>
+            <a:solidFill>
+              <a:schemeClr val="accent2">
+                <a:lumMod val="75000"/>
+              </a:schemeClr>
+            </a:solidFill>
+          </a:ln>
+        </p:spPr>
+        <p:style>
+          <a:lnRef idx="2">
+            <a:schemeClr val="accent1">
+              <a:shade val="50000"/>
+            </a:schemeClr>
+          </a:lnRef>
+          <a:fillRef idx="1">
+            <a:schemeClr val="accent1"/>
+          </a:fillRef>
+          <a:effectRef idx="0">
+            <a:schemeClr val="accent1"/>
+          </a:effectRef>
+          <a:fontRef idx="minor">
+            <a:schemeClr val="lt1"/>
+          </a:fontRef>
+        </p:style>
+        <p:txBody>
+          <a:bodyPr rtlCol="0" anchor="ctr"/>
+          <a:lstStyle/>
+          <a:p>
+            <a:pPr algn="ctr"/>
+            <a:endParaRPr lang="en-SG"/>
+          </a:p>
+        </p:txBody>
+      </p:sp>
+      <p:sp>
+        <p:nvSpPr>
+          <p:cNvPr id="35" name="Rectangle 34">
+            <a:extLst>
+              <a:ext uri="{FF2B5EF4-FFF2-40B4-BE49-F238E27FC236}">
+                <a16:creationId xmlns:a16="http://schemas.microsoft.com/office/drawing/2014/main" id="{1693F3D2-7F63-C87C-36F4-8EF79EF2D1E7}"/>
+              </a:ext>
+            </a:extLst>
+          </p:cNvPr>
+          <p:cNvSpPr/>
+          <p:nvPr/>
+        </p:nvSpPr>
+        <p:spPr>
+          <a:xfrm>
+            <a:off x="1240145" y="4858744"/>
+            <a:ext cx="4796627" cy="192670"/>
+          </a:xfrm>
+          <a:prstGeom prst="rect">
+            <a:avLst/>
+          </a:prstGeom>
+          <a:noFill/>
+          <a:ln>
+            <a:solidFill>
+              <a:schemeClr val="accent2">
+                <a:lumMod val="75000"/>
+              </a:schemeClr>
+            </a:solidFill>
+          </a:ln>
+        </p:spPr>
+        <p:style>
+          <a:lnRef idx="2">
+            <a:schemeClr val="accent1">
+              <a:shade val="50000"/>
+            </a:schemeClr>
+          </a:lnRef>
+          <a:fillRef idx="1">
+            <a:schemeClr val="accent1"/>
+          </a:fillRef>
+          <a:effectRef idx="0">
+            <a:schemeClr val="accent1"/>
+          </a:effectRef>
+          <a:fontRef idx="minor">
+            <a:schemeClr val="lt1"/>
+          </a:fontRef>
+        </p:style>
+        <p:txBody>
+          <a:bodyPr rtlCol="0" anchor="ctr"/>
+          <a:lstStyle/>
+          <a:p>
+            <a:pPr algn="ctr"/>
+            <a:endParaRPr lang="en-SG"/>
+          </a:p>
+        </p:txBody>
+      </p:sp>
+      <p:cxnSp>
+        <p:nvCxnSpPr>
+          <p:cNvPr id="36" name="Straight Connector 35">
+            <a:extLst>
+              <a:ext uri="{FF2B5EF4-FFF2-40B4-BE49-F238E27FC236}">
+                <a16:creationId xmlns:a16="http://schemas.microsoft.com/office/drawing/2014/main" id="{4D432AF0-286D-F0AF-8D65-C27FD0638CF9}"/>
+              </a:ext>
+            </a:extLst>
+          </p:cNvPr>
+          <p:cNvCxnSpPr>
+            <a:cxnSpLocks/>
+            <a:endCxn id="39" idx="1"/>
+          </p:cNvCxnSpPr>
+          <p:nvPr/>
+        </p:nvCxnSpPr>
+        <p:spPr>
+          <a:xfrm flipV="1">
+            <a:off x="4281645" y="4349430"/>
+            <a:ext cx="3807472" cy="629933"/>
+          </a:xfrm>
+          <a:prstGeom prst="line">
+            <a:avLst/>
+          </a:prstGeom>
+          <a:ln w="15875">
+            <a:solidFill>
+              <a:schemeClr val="accent2">
+                <a:lumMod val="75000"/>
+              </a:schemeClr>
+            </a:solidFill>
+          </a:ln>
+        </p:spPr>
+        <p:style>
+          <a:lnRef idx="1">
+            <a:schemeClr val="accent1"/>
+          </a:lnRef>
+          <a:fillRef idx="0">
+            <a:schemeClr val="accent1"/>
+          </a:fillRef>
+          <a:effectRef idx="0">
+            <a:schemeClr val="accent1"/>
+          </a:effectRef>
+          <a:fontRef idx="minor">
+            <a:schemeClr val="tx1"/>
+          </a:fontRef>
+        </p:style>
+      </p:cxnSp>
+      <p:sp>
+        <p:nvSpPr>
+          <p:cNvPr id="39" name="TextBox 38">
+            <a:extLst>
+              <a:ext uri="{FF2B5EF4-FFF2-40B4-BE49-F238E27FC236}">
+                <a16:creationId xmlns:a16="http://schemas.microsoft.com/office/drawing/2014/main" id="{5B9D32DC-2F6B-D78D-4328-7DA332105409}"/>
+              </a:ext>
+            </a:extLst>
+          </p:cNvPr>
+          <p:cNvSpPr txBox="1"/>
+          <p:nvPr/>
+        </p:nvSpPr>
+        <p:spPr>
+          <a:xfrm>
+            <a:off x="8089117" y="4180153"/>
+            <a:ext cx="1564852" cy="338554"/>
+          </a:xfrm>
+          <a:prstGeom prst="rect">
+            <a:avLst/>
+          </a:prstGeom>
+          <a:noFill/>
+        </p:spPr>
+        <p:txBody>
+          <a:bodyPr wrap="none" rtlCol="0">
+            <a:spAutoFit/>
+          </a:bodyPr>
+          <a:lstStyle/>
+          <a:p>
+            <a:r>
+              <a:rPr lang="en-SG" sz="800" b="1" dirty="0">
+                <a:latin typeface="Segoe UI" panose="020B0502040204020203" pitchFamily="34" charset="0"/>
+                <a:cs typeface="Segoe UI" panose="020B0502040204020203" pitchFamily="34" charset="0"/>
+              </a:rPr>
+              <a:t>Click row to view individual</a:t>
+            </a:r>
+          </a:p>
+          <a:p>
+            <a:r>
+              <a:rPr lang="en-SG" sz="800" b="1" dirty="0">
+                <a:latin typeface="Segoe UI" panose="020B0502040204020203" pitchFamily="34" charset="0"/>
+                <a:cs typeface="Segoe UI" panose="020B0502040204020203" pitchFamily="34" charset="0"/>
+              </a:rPr>
+              <a:t>HTTP Request and Response</a:t>
+            </a:r>
+          </a:p>
+        </p:txBody>
+      </p:sp>
+      <p:cxnSp>
+        <p:nvCxnSpPr>
+          <p:cNvPr id="48" name="Connector: Elbow 47">
+            <a:extLst>
+              <a:ext uri="{FF2B5EF4-FFF2-40B4-BE49-F238E27FC236}">
+                <a16:creationId xmlns:a16="http://schemas.microsoft.com/office/drawing/2014/main" id="{19622CE2-12C6-576E-DC5D-3698E4EE755F}"/>
+              </a:ext>
+            </a:extLst>
+          </p:cNvPr>
+          <p:cNvCxnSpPr>
+            <a:cxnSpLocks/>
+            <a:stCxn id="14" idx="2"/>
+          </p:cNvCxnSpPr>
+          <p:nvPr/>
+        </p:nvCxnSpPr>
+        <p:spPr>
+          <a:xfrm rot="5400000" flipH="1" flipV="1">
+            <a:off x="6216144" y="-1367647"/>
+            <a:ext cx="347180" cy="5829222"/>
+          </a:xfrm>
+          <a:prstGeom prst="bentConnector4">
+            <a:avLst>
+              <a:gd name="adj1" fmla="val -65845"/>
+              <a:gd name="adj2" fmla="val 100123"/>
+            </a:avLst>
+          </a:prstGeom>
+          <a:ln w="12700">
+            <a:solidFill>
+              <a:schemeClr val="accent2">
+                <a:lumMod val="75000"/>
+              </a:schemeClr>
+            </a:solidFill>
+            <a:tailEnd type="triangle"/>
+          </a:ln>
+        </p:spPr>
+        <p:style>
+          <a:lnRef idx="1">
+            <a:schemeClr val="accent1"/>
+          </a:lnRef>
+          <a:fillRef idx="0">
+            <a:schemeClr val="accent1"/>
+          </a:fillRef>
+          <a:effectRef idx="0">
+            <a:schemeClr val="accent1"/>
+          </a:effectRef>
+          <a:fontRef idx="minor">
+            <a:schemeClr val="tx1"/>
+          </a:fontRef>
+        </p:style>
+      </p:cxnSp>
+      <p:sp>
+        <p:nvSpPr>
+          <p:cNvPr id="53" name="Rectangle 52">
+            <a:extLst>
+              <a:ext uri="{FF2B5EF4-FFF2-40B4-BE49-F238E27FC236}">
+                <a16:creationId xmlns:a16="http://schemas.microsoft.com/office/drawing/2014/main" id="{1839BCD0-6DBE-648B-BD2F-422A02BC129C}"/>
+              </a:ext>
+            </a:extLst>
+          </p:cNvPr>
+          <p:cNvSpPr/>
+          <p:nvPr/>
+        </p:nvSpPr>
+        <p:spPr>
+          <a:xfrm>
+            <a:off x="6237003" y="3528313"/>
+            <a:ext cx="5099823" cy="252740"/>
+          </a:xfrm>
+          <a:prstGeom prst="rect">
+            <a:avLst/>
+          </a:prstGeom>
+          <a:noFill/>
+          <a:ln>
+            <a:solidFill>
+              <a:schemeClr val="accent2">
+                <a:lumMod val="75000"/>
+              </a:schemeClr>
+            </a:solidFill>
+          </a:ln>
+        </p:spPr>
+        <p:style>
+          <a:lnRef idx="2">
+            <a:schemeClr val="accent1">
+              <a:shade val="50000"/>
+            </a:schemeClr>
+          </a:lnRef>
+          <a:fillRef idx="1">
+            <a:schemeClr val="accent1"/>
+          </a:fillRef>
+          <a:effectRef idx="0">
+            <a:schemeClr val="accent1"/>
+          </a:effectRef>
+          <a:fontRef idx="minor">
+            <a:schemeClr val="lt1"/>
+          </a:fontRef>
+        </p:style>
+        <p:txBody>
+          <a:bodyPr rtlCol="0" anchor="ctr"/>
+          <a:lstStyle/>
+          <a:p>
+            <a:pPr algn="ctr"/>
+            <a:endParaRPr lang="en-SG"/>
+          </a:p>
+        </p:txBody>
+      </p:sp>
+      <p:sp>
+        <p:nvSpPr>
+          <p:cNvPr id="54" name="TextBox 53">
+            <a:extLst>
+              <a:ext uri="{FF2B5EF4-FFF2-40B4-BE49-F238E27FC236}">
+                <a16:creationId xmlns:a16="http://schemas.microsoft.com/office/drawing/2014/main" id="{20163005-8812-39D5-2081-A6C595987338}"/>
+              </a:ext>
+            </a:extLst>
+          </p:cNvPr>
+          <p:cNvSpPr txBox="1"/>
+          <p:nvPr/>
+        </p:nvSpPr>
+        <p:spPr>
+          <a:xfrm>
+            <a:off x="4378442" y="1334609"/>
+            <a:ext cx="519693" cy="415498"/>
+          </a:xfrm>
+          <a:prstGeom prst="rect">
+            <a:avLst/>
+          </a:prstGeom>
+          <a:noFill/>
+        </p:spPr>
+        <p:txBody>
+          <a:bodyPr wrap="none" rtlCol="0">
+            <a:spAutoFit/>
+          </a:bodyPr>
+          <a:lstStyle/>
+          <a:p>
+            <a:pPr algn="ctr"/>
+            <a:r>
+              <a:rPr lang="en-SG" sz="700" b="1" dirty="0">
+                <a:latin typeface="Segoe UI" panose="020B0502040204020203" pitchFamily="34" charset="0"/>
+                <a:cs typeface="Segoe UI" panose="020B0502040204020203" pitchFamily="34" charset="0"/>
+              </a:rPr>
+              <a:t>view </a:t>
+            </a:r>
+          </a:p>
+          <a:p>
+            <a:pPr algn="ctr"/>
+            <a:r>
+              <a:rPr lang="en-SG" sz="700" b="1" dirty="0">
+                <a:latin typeface="Segoe UI" panose="020B0502040204020203" pitchFamily="34" charset="0"/>
+                <a:cs typeface="Segoe UI" panose="020B0502040204020203" pitchFamily="34" charset="0"/>
+              </a:rPr>
+              <a:t>fuzzing </a:t>
+            </a:r>
+          </a:p>
+          <a:p>
+            <a:pPr algn="ctr"/>
+            <a:r>
+              <a:rPr lang="en-SG" sz="700" b="1" dirty="0">
+                <a:latin typeface="Segoe UI" panose="020B0502040204020203" pitchFamily="34" charset="0"/>
+                <a:cs typeface="Segoe UI" panose="020B0502040204020203" pitchFamily="34" charset="0"/>
+              </a:rPr>
+              <a:t>result</a:t>
+            </a:r>
+          </a:p>
+        </p:txBody>
+      </p:sp>
+      <p:sp>
+        <p:nvSpPr>
+          <p:cNvPr id="58" name="TextBox 57">
+            <a:extLst>
+              <a:ext uri="{FF2B5EF4-FFF2-40B4-BE49-F238E27FC236}">
+                <a16:creationId xmlns:a16="http://schemas.microsoft.com/office/drawing/2014/main" id="{E335FD64-0652-5C01-5369-205FC5378544}"/>
+              </a:ext>
+            </a:extLst>
+          </p:cNvPr>
+          <p:cNvSpPr txBox="1"/>
+          <p:nvPr/>
+        </p:nvSpPr>
+        <p:spPr>
+          <a:xfrm>
+            <a:off x="8089117" y="5424542"/>
+            <a:ext cx="1226618" cy="215444"/>
+          </a:xfrm>
+          <a:prstGeom prst="rect">
+            <a:avLst/>
+          </a:prstGeom>
+          <a:noFill/>
+        </p:spPr>
+        <p:txBody>
+          <a:bodyPr wrap="none" rtlCol="0">
+            <a:spAutoFit/>
+          </a:bodyPr>
+          <a:lstStyle/>
+          <a:p>
+            <a:r>
+              <a:rPr lang="en-SG" sz="800" b="1" dirty="0">
+                <a:latin typeface="Segoe UI" panose="020B0502040204020203" pitchFamily="34" charset="0"/>
+                <a:cs typeface="Segoe UI" panose="020B0502040204020203" pitchFamily="34" charset="0"/>
+              </a:rPr>
+              <a:t>View response details</a:t>
+            </a:r>
+          </a:p>
+        </p:txBody>
+      </p:sp>
+      <p:sp>
+        <p:nvSpPr>
+          <p:cNvPr id="59" name="Rectangle 58">
+            <a:extLst>
+              <a:ext uri="{FF2B5EF4-FFF2-40B4-BE49-F238E27FC236}">
+                <a16:creationId xmlns:a16="http://schemas.microsoft.com/office/drawing/2014/main" id="{C32D03CC-1565-E037-27D0-60008B07A1C9}"/>
+              </a:ext>
+            </a:extLst>
+          </p:cNvPr>
+          <p:cNvSpPr/>
+          <p:nvPr/>
+        </p:nvSpPr>
+        <p:spPr>
+          <a:xfrm>
+            <a:off x="6215687" y="5193156"/>
+            <a:ext cx="5099823" cy="252740"/>
+          </a:xfrm>
+          <a:prstGeom prst="rect">
+            <a:avLst/>
+          </a:prstGeom>
+          <a:noFill/>
+          <a:ln>
+            <a:solidFill>
+              <a:schemeClr val="accent2">
+                <a:lumMod val="75000"/>
+              </a:schemeClr>
+            </a:solidFill>
+          </a:ln>
+        </p:spPr>
+        <p:style>
+          <a:lnRef idx="2">
+            <a:schemeClr val="accent1">
+              <a:shade val="50000"/>
+            </a:schemeClr>
+          </a:lnRef>
+          <a:fillRef idx="1">
+            <a:schemeClr val="accent1"/>
+          </a:fillRef>
+          <a:effectRef idx="0">
+            <a:schemeClr val="accent1"/>
+          </a:effectRef>
+          <a:fontRef idx="minor">
+            <a:schemeClr val="lt1"/>
+          </a:fontRef>
+        </p:style>
+        <p:txBody>
+          <a:bodyPr rtlCol="0" anchor="ctr"/>
+          <a:lstStyle/>
+          <a:p>
+            <a:pPr algn="ctr"/>
+            <a:endParaRPr lang="en-SG"/>
+          </a:p>
+        </p:txBody>
+      </p:sp>
+      <p:sp>
+        <p:nvSpPr>
+          <p:cNvPr id="60" name="Rectangle 59">
+            <a:extLst>
+              <a:ext uri="{FF2B5EF4-FFF2-40B4-BE49-F238E27FC236}">
+                <a16:creationId xmlns:a16="http://schemas.microsoft.com/office/drawing/2014/main" id="{6EE0616A-1F31-FB60-4581-9ED7FC906D68}"/>
+              </a:ext>
+            </a:extLst>
+          </p:cNvPr>
+          <p:cNvSpPr/>
+          <p:nvPr/>
+        </p:nvSpPr>
+        <p:spPr>
+          <a:xfrm>
+            <a:off x="2503314" y="1053192"/>
+            <a:ext cx="245252" cy="192670"/>
+          </a:xfrm>
+          <a:prstGeom prst="rect">
+            <a:avLst/>
+          </a:prstGeom>
+          <a:noFill/>
+          <a:ln>
+            <a:solidFill>
+              <a:schemeClr val="accent2">
+                <a:lumMod val="75000"/>
+              </a:schemeClr>
+            </a:solidFill>
+          </a:ln>
+        </p:spPr>
+        <p:style>
+          <a:lnRef idx="2">
+            <a:schemeClr val="accent1">
+              <a:shade val="50000"/>
+            </a:schemeClr>
+          </a:lnRef>
+          <a:fillRef idx="1">
+            <a:schemeClr val="accent1"/>
+          </a:fillRef>
+          <a:effectRef idx="0">
+            <a:schemeClr val="accent1"/>
+          </a:effectRef>
+          <a:fontRef idx="minor">
+            <a:schemeClr val="lt1"/>
+          </a:fontRef>
+        </p:style>
+        <p:txBody>
+          <a:bodyPr rtlCol="0" anchor="ctr"/>
+          <a:lstStyle/>
+          <a:p>
+            <a:pPr algn="ctr"/>
+            <a:endParaRPr lang="en-SG"/>
+          </a:p>
+        </p:txBody>
+      </p:sp>
+      <p:sp>
+        <p:nvSpPr>
+          <p:cNvPr id="61" name="TextBox 60">
+            <a:extLst>
+              <a:ext uri="{FF2B5EF4-FFF2-40B4-BE49-F238E27FC236}">
+                <a16:creationId xmlns:a16="http://schemas.microsoft.com/office/drawing/2014/main" id="{9821B12E-56B2-DA3B-6FAD-3662B41E4807}"/>
+              </a:ext>
+            </a:extLst>
+          </p:cNvPr>
+          <p:cNvSpPr txBox="1"/>
+          <p:nvPr/>
+        </p:nvSpPr>
+        <p:spPr>
+          <a:xfrm>
+            <a:off x="2688031" y="974385"/>
+            <a:ext cx="542136" cy="338554"/>
+          </a:xfrm>
+          <a:prstGeom prst="rect">
+            <a:avLst/>
+          </a:prstGeom>
+          <a:noFill/>
+        </p:spPr>
+        <p:txBody>
+          <a:bodyPr wrap="none" rtlCol="0">
+            <a:spAutoFit/>
+          </a:bodyPr>
+          <a:lstStyle/>
+          <a:p>
+            <a:r>
+              <a:rPr lang="en-SG" sz="800" b="1" dirty="0">
+                <a:latin typeface="Segoe UI" panose="020B0502040204020203" pitchFamily="34" charset="0"/>
+                <a:cs typeface="Segoe UI" panose="020B0502040204020203" pitchFamily="34" charset="0"/>
+              </a:rPr>
+              <a:t>start</a:t>
+            </a:r>
+          </a:p>
+          <a:p>
+            <a:r>
+              <a:rPr lang="en-SG" sz="800" b="1" dirty="0">
+                <a:latin typeface="Segoe UI" panose="020B0502040204020203" pitchFamily="34" charset="0"/>
+                <a:cs typeface="Segoe UI" panose="020B0502040204020203" pitchFamily="34" charset="0"/>
+              </a:rPr>
+              <a:t>fuzzing</a:t>
+            </a:r>
+          </a:p>
+        </p:txBody>
+      </p:sp>
+      <p:sp>
+        <p:nvSpPr>
+          <p:cNvPr id="62" name="Rectangle 61">
+            <a:extLst>
+              <a:ext uri="{FF2B5EF4-FFF2-40B4-BE49-F238E27FC236}">
+                <a16:creationId xmlns:a16="http://schemas.microsoft.com/office/drawing/2014/main" id="{DC03CEF6-7708-B0FF-D387-C0268BC16844}"/>
+              </a:ext>
+            </a:extLst>
+          </p:cNvPr>
+          <p:cNvSpPr/>
+          <p:nvPr/>
+        </p:nvSpPr>
+        <p:spPr>
+          <a:xfrm>
+            <a:off x="4862883" y="1181783"/>
+            <a:ext cx="245252" cy="192670"/>
+          </a:xfrm>
+          <a:prstGeom prst="rect">
+            <a:avLst/>
+          </a:prstGeom>
+          <a:noFill/>
+          <a:ln>
+            <a:solidFill>
+              <a:schemeClr val="accent2">
+                <a:lumMod val="75000"/>
+              </a:schemeClr>
+            </a:solidFill>
+          </a:ln>
+        </p:spPr>
+        <p:style>
+          <a:lnRef idx="2">
+            <a:schemeClr val="accent1">
+              <a:shade val="50000"/>
+            </a:schemeClr>
+          </a:lnRef>
+          <a:fillRef idx="1">
+            <a:schemeClr val="accent1"/>
+          </a:fillRef>
+          <a:effectRef idx="0">
+            <a:schemeClr val="accent1"/>
+          </a:effectRef>
+          <a:fontRef idx="minor">
+            <a:schemeClr val="lt1"/>
+          </a:fontRef>
+        </p:style>
+        <p:txBody>
+          <a:bodyPr rtlCol="0" anchor="ctr"/>
+          <a:lstStyle/>
+          <a:p>
+            <a:pPr algn="ctr"/>
+            <a:endParaRPr lang="en-SG"/>
+          </a:p>
+        </p:txBody>
+      </p:sp>
+      <p:sp>
+        <p:nvSpPr>
+          <p:cNvPr id="63" name="TextBox 62">
+            <a:extLst>
+              <a:ext uri="{FF2B5EF4-FFF2-40B4-BE49-F238E27FC236}">
+                <a16:creationId xmlns:a16="http://schemas.microsoft.com/office/drawing/2014/main" id="{B3958E2B-0DBA-0971-1FD5-F0109CAB17B4}"/>
+              </a:ext>
+            </a:extLst>
+          </p:cNvPr>
+          <p:cNvSpPr txBox="1"/>
+          <p:nvPr/>
+        </p:nvSpPr>
+        <p:spPr>
+          <a:xfrm>
+            <a:off x="4804723" y="1347328"/>
+            <a:ext cx="1410964" cy="307777"/>
+          </a:xfrm>
+          <a:prstGeom prst="rect">
+            <a:avLst/>
+          </a:prstGeom>
+          <a:noFill/>
+        </p:spPr>
+        <p:txBody>
+          <a:bodyPr wrap="none" rtlCol="0">
+            <a:spAutoFit/>
+          </a:bodyPr>
+          <a:lstStyle/>
+          <a:p>
+            <a:r>
+              <a:rPr lang="en-SG" sz="700" b="1" dirty="0">
+                <a:latin typeface="Segoe UI" panose="020B0502040204020203" pitchFamily="34" charset="0"/>
+                <a:cs typeface="Segoe UI" panose="020B0502040204020203" pitchFamily="34" charset="0"/>
+              </a:rPr>
+              <a:t>Fuzz once only</a:t>
+            </a:r>
+          </a:p>
+          <a:p>
+            <a:r>
+              <a:rPr lang="en-SG" sz="700" b="1" dirty="0">
+                <a:latin typeface="Segoe UI" panose="020B0502040204020203" pitchFamily="34" charset="0"/>
+                <a:cs typeface="Segoe UI" panose="020B0502040204020203" pitchFamily="34" charset="0"/>
+              </a:rPr>
+              <a:t>Edit request message per API</a:t>
+            </a:r>
+          </a:p>
+        </p:txBody>
+      </p:sp>
+    </p:spTree>
+    <p:extLst>
+      <p:ext uri="{BB962C8B-B14F-4D97-AF65-F5344CB8AC3E}">
+        <p14:creationId xmlns:p14="http://schemas.microsoft.com/office/powerpoint/2010/main" val="3948254220"/>
+      </p:ext>
+    </p:extLst>
+  </p:cSld>
+  <p:clrMapOvr>
+    <a:masterClrMapping/>
+  </p:clrMapOvr>
+</p:sld>
+</file>
+
 <file path=ppt/theme/theme1.xml><?xml version="1.0" encoding="utf-8"?>
 <a:theme xmlns:a="http://schemas.openxmlformats.org/drawingml/2006/main" name="Office Theme">
   <a:themeElements>

</xml_diff>